<commit_message>
Modificacion de la presentacion
</commit_message>
<xml_diff>
--- a/Documentacion/Publicable/Borradores/Intro a Vortex.pptx
+++ b/Documentacion/Publicable/Borradores/Intro a Vortex.pptx
@@ -406,7 +406,7 @@
           <a:p>
             <a:fld id="{ED7AE805-304E-459A-ADC4-3CE86BC0EA48}" type="datetimeFigureOut">
               <a:rPr lang="es-AR" smtClean="0"/>
-              <a:t>2013-02-17</a:t>
+              <a:t>18/02/2013</a:t>
             </a:fld>
             <a:endParaRPr lang="es-AR"/>
           </a:p>
@@ -635,7 +635,7 @@
           <a:p>
             <a:fld id="{A3A3B08F-A521-47F1-92CF-23ABFE44263A}" type="slidenum">
               <a:rPr lang="es-AR" smtClean="0"/>
-              <a:t>‹#›</a:t>
+              <a:t>‹Nº›</a:t>
             </a:fld>
             <a:endParaRPr lang="es-AR"/>
           </a:p>
@@ -799,7 +799,7 @@
           <a:p>
             <a:fld id="{ED7AE805-304E-459A-ADC4-3CE86BC0EA48}" type="datetimeFigureOut">
               <a:rPr lang="es-AR" smtClean="0"/>
-              <a:t>2013-02-17</a:t>
+              <a:t>18/02/2013</a:t>
             </a:fld>
             <a:endParaRPr lang="es-AR"/>
           </a:p>
@@ -841,7 +841,7 @@
           <a:p>
             <a:fld id="{A3A3B08F-A521-47F1-92CF-23ABFE44263A}" type="slidenum">
               <a:rPr lang="es-AR" smtClean="0"/>
-              <a:t>‹#›</a:t>
+              <a:t>‹Nº›</a:t>
             </a:fld>
             <a:endParaRPr lang="es-AR"/>
           </a:p>
@@ -1251,7 +1251,7 @@
           <a:p>
             <a:fld id="{A3A3B08F-A521-47F1-92CF-23ABFE44263A}" type="slidenum">
               <a:rPr lang="es-AR" smtClean="0"/>
-              <a:t>‹#›</a:t>
+              <a:t>‹Nº›</a:t>
             </a:fld>
             <a:endParaRPr lang="es-AR"/>
           </a:p>
@@ -1331,7 +1331,7 @@
           <a:p>
             <a:fld id="{ED7AE805-304E-459A-ADC4-3CE86BC0EA48}" type="datetimeFigureOut">
               <a:rPr lang="es-AR" smtClean="0"/>
-              <a:t>2013-02-17</a:t>
+              <a:t>18/02/2013</a:t>
             </a:fld>
             <a:endParaRPr lang="es-AR"/>
           </a:p>
@@ -1464,7 +1464,7 @@
           <a:p>
             <a:fld id="{ED7AE805-304E-459A-ADC4-3CE86BC0EA48}" type="datetimeFigureOut">
               <a:rPr lang="es-AR" smtClean="0"/>
-              <a:t>2013-02-17</a:t>
+              <a:t>18/02/2013</a:t>
             </a:fld>
             <a:endParaRPr lang="es-AR"/>
           </a:p>
@@ -1511,7 +1511,7 @@
           <a:p>
             <a:fld id="{A3A3B08F-A521-47F1-92CF-23ABFE44263A}" type="slidenum">
               <a:rPr lang="es-AR" smtClean="0"/>
-              <a:t>‹#›</a:t>
+              <a:t>‹Nº›</a:t>
             </a:fld>
             <a:endParaRPr lang="es-AR"/>
           </a:p>
@@ -2007,7 +2007,7 @@
           <a:p>
             <a:fld id="{ED7AE805-304E-459A-ADC4-3CE86BC0EA48}" type="datetimeFigureOut">
               <a:rPr lang="es-AR" smtClean="0"/>
-              <a:t>2013-02-17</a:t>
+              <a:t>18/02/2013</a:t>
             </a:fld>
             <a:endParaRPr lang="es-AR"/>
           </a:p>
@@ -2179,7 +2179,7 @@
           <a:p>
             <a:fld id="{A3A3B08F-A521-47F1-92CF-23ABFE44263A}" type="slidenum">
               <a:rPr lang="es-AR" smtClean="0"/>
-              <a:t>‹#›</a:t>
+              <a:t>‹Nº›</a:t>
             </a:fld>
             <a:endParaRPr lang="es-AR"/>
           </a:p>
@@ -2302,7 +2302,7 @@
           <a:p>
             <a:fld id="{ED7AE805-304E-459A-ADC4-3CE86BC0EA48}" type="datetimeFigureOut">
               <a:rPr lang="es-AR" smtClean="0"/>
-              <a:t>2013-02-17</a:t>
+              <a:t>18/02/2013</a:t>
             </a:fld>
             <a:endParaRPr lang="es-AR"/>
           </a:p>
@@ -2344,7 +2344,7 @@
           <a:p>
             <a:fld id="{A3A3B08F-A521-47F1-92CF-23ABFE44263A}" type="slidenum">
               <a:rPr lang="es-AR" smtClean="0"/>
-              <a:t>‹#›</a:t>
+              <a:t>‹Nº›</a:t>
             </a:fld>
             <a:endParaRPr lang="es-AR"/>
           </a:p>
@@ -2961,7 +2961,7 @@
           <a:p>
             <a:fld id="{ED7AE805-304E-459A-ADC4-3CE86BC0EA48}" type="datetimeFigureOut">
               <a:rPr lang="es-AR" smtClean="0"/>
-              <a:t>2013-02-17</a:t>
+              <a:t>18/02/2013</a:t>
             </a:fld>
             <a:endParaRPr lang="es-AR"/>
           </a:p>
@@ -3303,7 +3303,7 @@
           <a:p>
             <a:fld id="{A3A3B08F-A521-47F1-92CF-23ABFE44263A}" type="slidenum">
               <a:rPr lang="es-AR" smtClean="0"/>
-              <a:t>‹#›</a:t>
+              <a:t>‹Nº›</a:t>
             </a:fld>
             <a:endParaRPr lang="es-AR"/>
           </a:p>
@@ -3397,7 +3397,7 @@
           <a:p>
             <a:fld id="{ED7AE805-304E-459A-ADC4-3CE86BC0EA48}" type="datetimeFigureOut">
               <a:rPr lang="es-AR" smtClean="0"/>
-              <a:t>2013-02-17</a:t>
+              <a:t>18/02/2013</a:t>
             </a:fld>
             <a:endParaRPr lang="es-AR"/>
           </a:p>
@@ -3444,7 +3444,7 @@
           <a:p>
             <a:fld id="{A3A3B08F-A521-47F1-92CF-23ABFE44263A}" type="slidenum">
               <a:rPr lang="es-AR" smtClean="0"/>
-              <a:t>‹#›</a:t>
+              <a:t>‹Nº›</a:t>
             </a:fld>
             <a:endParaRPr lang="es-AR"/>
           </a:p>
@@ -3710,7 +3710,7 @@
           <a:p>
             <a:fld id="{ED7AE805-304E-459A-ADC4-3CE86BC0EA48}" type="datetimeFigureOut">
               <a:rPr lang="es-AR" smtClean="0"/>
-              <a:t>2013-02-17</a:t>
+              <a:t>18/02/2013</a:t>
             </a:fld>
             <a:endParaRPr lang="es-AR"/>
           </a:p>
@@ -3765,7 +3765,7 @@
           <a:p>
             <a:fld id="{A3A3B08F-A521-47F1-92CF-23ABFE44263A}" type="slidenum">
               <a:rPr lang="es-AR" smtClean="0"/>
-              <a:t>‹#›</a:t>
+              <a:t>‹Nº›</a:t>
             </a:fld>
             <a:endParaRPr lang="es-AR"/>
           </a:p>
@@ -4383,7 +4383,7 @@
           <a:p>
             <a:fld id="{A3A3B08F-A521-47F1-92CF-23ABFE44263A}" type="slidenum">
               <a:rPr lang="es-AR" smtClean="0"/>
-              <a:t>‹#›</a:t>
+              <a:t>‹Nº›</a:t>
             </a:fld>
             <a:endParaRPr lang="es-AR"/>
           </a:p>
@@ -4442,7 +4442,7 @@
           <a:p>
             <a:fld id="{ED7AE805-304E-459A-ADC4-3CE86BC0EA48}" type="datetimeFigureOut">
               <a:rPr lang="es-AR" smtClean="0"/>
-              <a:t>2013-02-17</a:t>
+              <a:t>18/02/2013</a:t>
             </a:fld>
             <a:endParaRPr lang="es-AR"/>
           </a:p>
@@ -4917,7 +4917,7 @@
           <a:p>
             <a:fld id="{A3A3B08F-A521-47F1-92CF-23ABFE44263A}" type="slidenum">
               <a:rPr lang="es-AR" smtClean="0"/>
-              <a:t>‹#›</a:t>
+              <a:t>‹Nº›</a:t>
             </a:fld>
             <a:endParaRPr lang="es-AR"/>
           </a:p>
@@ -5106,7 +5106,7 @@
           <a:p>
             <a:fld id="{ED7AE805-304E-459A-ADC4-3CE86BC0EA48}" type="datetimeFigureOut">
               <a:rPr lang="es-AR" smtClean="0"/>
-              <a:t>2013-02-17</a:t>
+              <a:t>18/02/2013</a:t>
             </a:fld>
             <a:endParaRPr lang="es-AR"/>
           </a:p>
@@ -5379,7 +5379,7 @@
           <a:p>
             <a:fld id="{ED7AE805-304E-459A-ADC4-3CE86BC0EA48}" type="datetimeFigureOut">
               <a:rPr lang="es-AR" smtClean="0"/>
-              <a:t>2013-02-17</a:t>
+              <a:t>18/02/2013</a:t>
             </a:fld>
             <a:endParaRPr lang="es-AR"/>
           </a:p>
@@ -5629,7 +5629,7 @@
           <a:p>
             <a:fld id="{A3A3B08F-A521-47F1-92CF-23ABFE44263A}" type="slidenum">
               <a:rPr lang="es-AR" smtClean="0"/>
-              <a:t>‹#›</a:t>
+              <a:t>‹Nº›</a:t>
             </a:fld>
             <a:endParaRPr lang="es-AR"/>
           </a:p>
@@ -6136,6 +6136,57 @@
           </a:prstGeom>
         </p:spPr>
       </p:pic>
+      <p:sp>
+        <p:nvSpPr>
+          <p:cNvPr id="4" name="3 CuadroTexto"/>
+          <p:cNvSpPr txBox="1"/>
+          <p:nvPr/>
+        </p:nvSpPr>
+        <p:spPr>
+          <a:xfrm>
+            <a:off x="683568" y="4581128"/>
+            <a:ext cx="7776864" cy="1152128"/>
+          </a:xfrm>
+          <a:prstGeom prst="rect">
+            <a:avLst/>
+          </a:prstGeom>
+          <a:noFill/>
+        </p:spPr>
+        <p:txBody>
+          <a:bodyPr wrap="square" rtlCol="0">
+            <a:normAutofit/>
+          </a:bodyPr>
+          <a:lstStyle/>
+          <a:p>
+            <a:r>
+              <a:rPr lang="en-US" dirty="0"/>
+              <a:t>"I thought of objects being like biological cells and/or individual computers on a network, only able to communicate with </a:t>
+            </a:r>
+            <a:r>
+              <a:rPr lang="en-US" dirty="0" smtClean="0"/>
+              <a:t>messages“</a:t>
+            </a:r>
+          </a:p>
+          <a:p>
+            <a:r>
+              <a:rPr lang="en-US" dirty="0" smtClean="0"/>
+              <a:t/>
+            </a:r>
+            <a:br>
+              <a:rPr lang="en-US" dirty="0" smtClean="0"/>
+            </a:br>
+            <a:r>
+              <a:rPr lang="en-US" sz="1400" i="1" dirty="0" smtClean="0"/>
+              <a:t>Alan </a:t>
+            </a:r>
+            <a:r>
+              <a:rPr lang="en-US" sz="1400" i="1" dirty="0"/>
+              <a:t>Kay, creator of Smalltalk, on the meaning of "object oriented programming"</a:t>
+            </a:r>
+            <a:endParaRPr lang="es-AR" dirty="0"/>
+          </a:p>
+        </p:txBody>
+      </p:sp>
     </p:spTree>
     <p:extLst>
       <p:ext uri="{BB962C8B-B14F-4D97-AF65-F5344CB8AC3E}">
@@ -9214,11 +9265,7 @@
           <a:p>
             <a:r>
               <a:rPr lang="es-AR" dirty="0" smtClean="0"/>
-              <a:t>Cómo</a:t>
-            </a:r>
-            <a:r>
-              <a:rPr lang="es-AR" dirty="0" smtClean="0"/>
-              <a:t>? 2</a:t>
+              <a:t>Cómo? 2</a:t>
             </a:r>
             <a:endParaRPr lang="es-AR" dirty="0"/>
           </a:p>
@@ -9622,8 +9669,23 @@
           <a:p>
             <a:r>
               <a:rPr lang="es-AR" dirty="0" smtClean="0"/>
-              <a:t>Realizar aplicaciones de valor real (no solo demos)</a:t>
-            </a:r>
+              <a:t>Realizar aplicaciones de valor real (no solo demos</a:t>
+            </a:r>
+            <a:r>
+              <a:rPr lang="es-AR" dirty="0" smtClean="0"/>
+              <a:t>)</a:t>
+            </a:r>
+          </a:p>
+          <a:p>
+            <a:r>
+              <a:rPr lang="es-AR" dirty="0" smtClean="0"/>
+              <a:t>Resolver problema </a:t>
+            </a:r>
+            <a:r>
+              <a:rPr lang="es-AR" smtClean="0"/>
+              <a:t>de inclusión de filtros</a:t>
+            </a:r>
+            <a:endParaRPr lang="es-AR" dirty="0" smtClean="0"/>
           </a:p>
           <a:p>
             <a:endParaRPr lang="es-AR" dirty="0"/>

</xml_diff>